<commit_message>
fixed land cover on the map
</commit_message>
<xml_diff>
--- a/Figures/Map/formatting map.pptx
+++ b/Figures/Map/formatting map.pptx
@@ -270,7 +270,7 @@
           <a:p>
             <a:fld id="{BE0D65D8-96DE-428F-89CD-4BBF653DDF08}" type="datetimeFigureOut">
               <a:rPr lang="en-US" smtClean="0"/>
-              <a:t>10/8/2024</a:t>
+              <a:t>10/10/2024</a:t>
             </a:fld>
             <a:endParaRPr lang="en-US"/>
           </a:p>
@@ -468,7 +468,7 @@
           <a:p>
             <a:fld id="{BE0D65D8-96DE-428F-89CD-4BBF653DDF08}" type="datetimeFigureOut">
               <a:rPr lang="en-US" smtClean="0"/>
-              <a:t>10/8/2024</a:t>
+              <a:t>10/10/2024</a:t>
             </a:fld>
             <a:endParaRPr lang="en-US"/>
           </a:p>
@@ -676,7 +676,7 @@
           <a:p>
             <a:fld id="{BE0D65D8-96DE-428F-89CD-4BBF653DDF08}" type="datetimeFigureOut">
               <a:rPr lang="en-US" smtClean="0"/>
-              <a:t>10/8/2024</a:t>
+              <a:t>10/10/2024</a:t>
             </a:fld>
             <a:endParaRPr lang="en-US"/>
           </a:p>
@@ -874,7 +874,7 @@
           <a:p>
             <a:fld id="{BE0D65D8-96DE-428F-89CD-4BBF653DDF08}" type="datetimeFigureOut">
               <a:rPr lang="en-US" smtClean="0"/>
-              <a:t>10/8/2024</a:t>
+              <a:t>10/10/2024</a:t>
             </a:fld>
             <a:endParaRPr lang="en-US"/>
           </a:p>
@@ -1149,7 +1149,7 @@
           <a:p>
             <a:fld id="{BE0D65D8-96DE-428F-89CD-4BBF653DDF08}" type="datetimeFigureOut">
               <a:rPr lang="en-US" smtClean="0"/>
-              <a:t>10/8/2024</a:t>
+              <a:t>10/10/2024</a:t>
             </a:fld>
             <a:endParaRPr lang="en-US"/>
           </a:p>
@@ -1414,7 +1414,7 @@
           <a:p>
             <a:fld id="{BE0D65D8-96DE-428F-89CD-4BBF653DDF08}" type="datetimeFigureOut">
               <a:rPr lang="en-US" smtClean="0"/>
-              <a:t>10/8/2024</a:t>
+              <a:t>10/10/2024</a:t>
             </a:fld>
             <a:endParaRPr lang="en-US"/>
           </a:p>
@@ -1826,7 +1826,7 @@
           <a:p>
             <a:fld id="{BE0D65D8-96DE-428F-89CD-4BBF653DDF08}" type="datetimeFigureOut">
               <a:rPr lang="en-US" smtClean="0"/>
-              <a:t>10/8/2024</a:t>
+              <a:t>10/10/2024</a:t>
             </a:fld>
             <a:endParaRPr lang="en-US"/>
           </a:p>
@@ -1967,7 +1967,7 @@
           <a:p>
             <a:fld id="{BE0D65D8-96DE-428F-89CD-4BBF653DDF08}" type="datetimeFigureOut">
               <a:rPr lang="en-US" smtClean="0"/>
-              <a:t>10/8/2024</a:t>
+              <a:t>10/10/2024</a:t>
             </a:fld>
             <a:endParaRPr lang="en-US"/>
           </a:p>
@@ -2080,7 +2080,7 @@
           <a:p>
             <a:fld id="{BE0D65D8-96DE-428F-89CD-4BBF653DDF08}" type="datetimeFigureOut">
               <a:rPr lang="en-US" smtClean="0"/>
-              <a:t>10/8/2024</a:t>
+              <a:t>10/10/2024</a:t>
             </a:fld>
             <a:endParaRPr lang="en-US"/>
           </a:p>
@@ -2391,7 +2391,7 @@
           <a:p>
             <a:fld id="{BE0D65D8-96DE-428F-89CD-4BBF653DDF08}" type="datetimeFigureOut">
               <a:rPr lang="en-US" smtClean="0"/>
-              <a:t>10/8/2024</a:t>
+              <a:t>10/10/2024</a:t>
             </a:fld>
             <a:endParaRPr lang="en-US"/>
           </a:p>
@@ -2679,7 +2679,7 @@
           <a:p>
             <a:fld id="{BE0D65D8-96DE-428F-89CD-4BBF653DDF08}" type="datetimeFigureOut">
               <a:rPr lang="en-US" smtClean="0"/>
-              <a:t>10/8/2024</a:t>
+              <a:t>10/10/2024</a:t>
             </a:fld>
             <a:endParaRPr lang="en-US"/>
           </a:p>
@@ -2920,7 +2920,7 @@
           <a:p>
             <a:fld id="{BE0D65D8-96DE-428F-89CD-4BBF653DDF08}" type="datetimeFigureOut">
               <a:rPr lang="en-US" smtClean="0"/>
-              <a:t>10/8/2024</a:t>
+              <a:t>10/10/2024</a:t>
             </a:fld>
             <a:endParaRPr lang="en-US"/>
           </a:p>
@@ -3552,7 +3552,7 @@
                           <a:latin typeface="Arial" panose="020B0604020202020204" pitchFamily="34" charset="0"/>
                           <a:cs typeface="Arial" panose="020B0604020202020204" pitchFamily="34" charset="0"/>
                         </a:rPr>
-                        <a:t>27.3%</a:t>
+                        <a:t>1.25%</a:t>
                       </a:r>
                     </a:p>
                   </p:txBody>
@@ -3590,7 +3590,7 @@
                           <a:latin typeface="Arial" panose="020B0604020202020204" pitchFamily="34" charset="0"/>
                           <a:cs typeface="Arial" panose="020B0604020202020204" pitchFamily="34" charset="0"/>
                         </a:rPr>
-                        <a:t>1.20%</a:t>
+                        <a:t>27.6%</a:t>
                       </a:r>
                     </a:p>
                   </p:txBody>
@@ -3666,7 +3666,7 @@
                           <a:latin typeface="Arial" panose="020B0604020202020204" pitchFamily="34" charset="0"/>
                           <a:cs typeface="Arial" panose="020B0604020202020204" pitchFamily="34" charset="0"/>
                         </a:rPr>
-                        <a:t>5.20%</a:t>
+                        <a:t>14.8%</a:t>
                       </a:r>
                     </a:p>
                   </p:txBody>
@@ -3704,7 +3704,7 @@
                           <a:latin typeface="Arial" panose="020B0604020202020204" pitchFamily="34" charset="0"/>
                           <a:cs typeface="Arial" panose="020B0604020202020204" pitchFamily="34" charset="0"/>
                         </a:rPr>
-                        <a:t>14.8%</a:t>
+                        <a:t>5.17%</a:t>
                       </a:r>
                     </a:p>
                   </p:txBody>
@@ -3742,7 +3742,7 @@
                           <a:latin typeface="Arial" panose="020B0604020202020204" pitchFamily="34" charset="0"/>
                           <a:cs typeface="Arial" panose="020B0604020202020204" pitchFamily="34" charset="0"/>
                         </a:rPr>
-                        <a:t>27.6%</a:t>
+                        <a:t>27.3%</a:t>
                       </a:r>
                     </a:p>
                   </p:txBody>

</xml_diff>